<commit_message>
working but 1st order
</commit_message>
<xml_diff>
--- a/Homework 2/Doc/homework02.pptx
+++ b/Homework 2/Doc/homework02.pptx
@@ -200,7 +200,7 @@
           <a:p>
             <a:fld id="{036E673D-988D-465F-A878-8670C341558C}" type="datetimeFigureOut">
               <a:rPr lang="en-IE" smtClean="0"/>
-              <a:t>26/02/2020</a:t>
+              <a:t>27/02/2020</a:t>
             </a:fld>
             <a:endParaRPr lang="en-IE"/>
           </a:p>
@@ -851,7 +851,7 @@
           <a:p>
             <a:fld id="{5CAFDD92-2592-4882-832B-488F7804558B}" type="datetimeFigureOut">
               <a:rPr lang="en-IE" smtClean="0"/>
-              <a:t>26/02/2020</a:t>
+              <a:t>27/02/2020</a:t>
             </a:fld>
             <a:endParaRPr lang="en-IE"/>
           </a:p>
@@ -1021,7 +1021,7 @@
           <a:p>
             <a:fld id="{5CAFDD92-2592-4882-832B-488F7804558B}" type="datetimeFigureOut">
               <a:rPr lang="en-IE" smtClean="0"/>
-              <a:t>26/02/2020</a:t>
+              <a:t>27/02/2020</a:t>
             </a:fld>
             <a:endParaRPr lang="en-IE"/>
           </a:p>
@@ -1201,7 +1201,7 @@
           <a:p>
             <a:fld id="{5CAFDD92-2592-4882-832B-488F7804558B}" type="datetimeFigureOut">
               <a:rPr lang="en-IE" smtClean="0"/>
-              <a:t>26/02/2020</a:t>
+              <a:t>27/02/2020</a:t>
             </a:fld>
             <a:endParaRPr lang="en-IE"/>
           </a:p>
@@ -1371,7 +1371,7 @@
           <a:p>
             <a:fld id="{5CAFDD92-2592-4882-832B-488F7804558B}" type="datetimeFigureOut">
               <a:rPr lang="en-IE" smtClean="0"/>
-              <a:t>26/02/2020</a:t>
+              <a:t>27/02/2020</a:t>
             </a:fld>
             <a:endParaRPr lang="en-IE"/>
           </a:p>
@@ -1617,7 +1617,7 @@
           <a:p>
             <a:fld id="{5CAFDD92-2592-4882-832B-488F7804558B}" type="datetimeFigureOut">
               <a:rPr lang="en-IE" smtClean="0"/>
-              <a:t>26/02/2020</a:t>
+              <a:t>27/02/2020</a:t>
             </a:fld>
             <a:endParaRPr lang="en-IE"/>
           </a:p>
@@ -1849,7 +1849,7 @@
           <a:p>
             <a:fld id="{5CAFDD92-2592-4882-832B-488F7804558B}" type="datetimeFigureOut">
               <a:rPr lang="en-IE" smtClean="0"/>
-              <a:t>26/02/2020</a:t>
+              <a:t>27/02/2020</a:t>
             </a:fld>
             <a:endParaRPr lang="en-IE"/>
           </a:p>
@@ -2216,7 +2216,7 @@
           <a:p>
             <a:fld id="{5CAFDD92-2592-4882-832B-488F7804558B}" type="datetimeFigureOut">
               <a:rPr lang="en-IE" smtClean="0"/>
-              <a:t>26/02/2020</a:t>
+              <a:t>27/02/2020</a:t>
             </a:fld>
             <a:endParaRPr lang="en-IE"/>
           </a:p>
@@ -2334,7 +2334,7 @@
           <a:p>
             <a:fld id="{5CAFDD92-2592-4882-832B-488F7804558B}" type="datetimeFigureOut">
               <a:rPr lang="en-IE" smtClean="0"/>
-              <a:t>26/02/2020</a:t>
+              <a:t>27/02/2020</a:t>
             </a:fld>
             <a:endParaRPr lang="en-IE"/>
           </a:p>
@@ -2429,7 +2429,7 @@
           <a:p>
             <a:fld id="{5CAFDD92-2592-4882-832B-488F7804558B}" type="datetimeFigureOut">
               <a:rPr lang="en-IE" smtClean="0"/>
-              <a:t>26/02/2020</a:t>
+              <a:t>27/02/2020</a:t>
             </a:fld>
             <a:endParaRPr lang="en-IE"/>
           </a:p>
@@ -2706,7 +2706,7 @@
           <a:p>
             <a:fld id="{5CAFDD92-2592-4882-832B-488F7804558B}" type="datetimeFigureOut">
               <a:rPr lang="en-IE" smtClean="0"/>
-              <a:t>26/02/2020</a:t>
+              <a:t>27/02/2020</a:t>
             </a:fld>
             <a:endParaRPr lang="en-IE"/>
           </a:p>
@@ -2959,7 +2959,7 @@
           <a:p>
             <a:fld id="{5CAFDD92-2592-4882-832B-488F7804558B}" type="datetimeFigureOut">
               <a:rPr lang="en-IE" smtClean="0"/>
-              <a:t>26/02/2020</a:t>
+              <a:t>27/02/2020</a:t>
             </a:fld>
             <a:endParaRPr lang="en-IE"/>
           </a:p>
@@ -3172,7 +3172,7 @@
           <a:p>
             <a:fld id="{5CAFDD92-2592-4882-832B-488F7804558B}" type="datetimeFigureOut">
               <a:rPr lang="en-IE" smtClean="0"/>
-              <a:t>26/02/2020</a:t>
+              <a:t>27/02/2020</a:t>
             </a:fld>
             <a:endParaRPr lang="en-IE"/>
           </a:p>
@@ -3721,6 +3721,103 @@
           </a:p>
         </p:txBody>
       </p:sp>
+      <p:pic>
+        <p:nvPicPr>
+          <p:cNvPr id="107" name="Picture 106"/>
+          <p:cNvPicPr>
+            <a:picLocks noChangeAspect="1"/>
+          </p:cNvPicPr>
+          <p:nvPr/>
+        </p:nvPicPr>
+        <p:blipFill>
+          <a:blip r:embed="rId3"/>
+          <a:stretch>
+            <a:fillRect/>
+          </a:stretch>
+        </p:blipFill>
+        <p:spPr>
+          <a:xfrm>
+            <a:off x="5356445" y="1470582"/>
+            <a:ext cx="6756498" cy="3722875"/>
+          </a:xfrm>
+          <a:prstGeom prst="rect">
+            <a:avLst/>
+          </a:prstGeom>
+          <a:ln w="19050">
+            <a:solidFill>
+              <a:schemeClr val="tx1"/>
+            </a:solidFill>
+          </a:ln>
+        </p:spPr>
+      </p:pic>
+      <p:pic>
+        <p:nvPicPr>
+          <p:cNvPr id="108" name="Picture 107"/>
+          <p:cNvPicPr>
+            <a:picLocks noChangeAspect="1"/>
+          </p:cNvPicPr>
+          <p:nvPr/>
+        </p:nvPicPr>
+        <p:blipFill rotWithShape="1">
+          <a:blip r:embed="rId4"/>
+          <a:srcRect l="-743" t="-654" r="38559" b="654"/>
+          <a:stretch/>
+        </p:blipFill>
+        <p:spPr>
+          <a:xfrm>
+            <a:off x="107336" y="740427"/>
+            <a:ext cx="3925193" cy="5719735"/>
+          </a:xfrm>
+          <a:prstGeom prst="rect">
+            <a:avLst/>
+          </a:prstGeom>
+          <a:ln w="19050">
+            <a:solidFill>
+              <a:schemeClr val="tx1"/>
+            </a:solidFill>
+          </a:ln>
+        </p:spPr>
+      </p:pic>
+      <p:sp>
+        <p:nvSpPr>
+          <p:cNvPr id="109" name="Right Arrow 108"/>
+          <p:cNvSpPr/>
+          <p:nvPr/>
+        </p:nvSpPr>
+        <p:spPr>
+          <a:xfrm>
+            <a:off x="4170289" y="2573518"/>
+            <a:ext cx="1048396" cy="1124358"/>
+          </a:xfrm>
+          <a:prstGeom prst="rightArrow">
+            <a:avLst/>
+          </a:prstGeom>
+        </p:spPr>
+        <p:style>
+          <a:lnRef idx="2">
+            <a:schemeClr val="accent1">
+              <a:shade val="50000"/>
+            </a:schemeClr>
+          </a:lnRef>
+          <a:fillRef idx="1">
+            <a:schemeClr val="accent1"/>
+          </a:fillRef>
+          <a:effectRef idx="0">
+            <a:schemeClr val="accent1"/>
+          </a:effectRef>
+          <a:fontRef idx="minor">
+            <a:schemeClr val="lt1"/>
+          </a:fontRef>
+        </p:style>
+        <p:txBody>
+          <a:bodyPr rtlCol="0" anchor="ctr"/>
+          <a:lstStyle/>
+          <a:p>
+            <a:pPr algn="ctr"/>
+            <a:endParaRPr lang="en-IE"/>
+          </a:p>
+        </p:txBody>
+      </p:sp>
     </p:spTree>
     <p:extLst>
       <p:ext uri="{BB962C8B-B14F-4D97-AF65-F5344CB8AC3E}">
@@ -4049,27 +4146,7 @@
                 <a:latin typeface="Times New Roman" panose="02020603050405020304" pitchFamily="18" charset="0"/>
                 <a:cs typeface="Times New Roman" panose="02020603050405020304" pitchFamily="18" charset="0"/>
               </a:rPr>
-              <a:t>Animation of </a:t>
-            </a:r>
-            <a:r>
-              <a:rPr lang="en-US" sz="2400" b="1" dirty="0" smtClean="0">
-                <a:solidFill>
-                  <a:srgbClr val="FF0000"/>
-                </a:solidFill>
-                <a:latin typeface="Times New Roman" panose="02020603050405020304" pitchFamily="18" charset="0"/>
-                <a:cs typeface="Times New Roman" panose="02020603050405020304" pitchFamily="18" charset="0"/>
-              </a:rPr>
-              <a:t>80*80 </a:t>
-            </a:r>
-            <a:r>
-              <a:rPr lang="en-US" sz="2400" b="1" dirty="0" smtClean="0">
-                <a:solidFill>
-                  <a:srgbClr val="FF0000"/>
-                </a:solidFill>
-                <a:latin typeface="Times New Roman" panose="02020603050405020304" pitchFamily="18" charset="0"/>
-                <a:cs typeface="Times New Roman" panose="02020603050405020304" pitchFamily="18" charset="0"/>
-              </a:rPr>
-              <a:t>grid</a:t>
+              <a:t>Animation of 80*80 grid</a:t>
             </a:r>
             <a:endParaRPr lang="en-IE" sz="2400" b="1" dirty="0">
               <a:solidFill>
@@ -4414,14 +4491,7 @@
                 <a:latin typeface="Times New Roman" panose="02020603050405020304" pitchFamily="18" charset="0"/>
                 <a:cs typeface="Times New Roman" panose="02020603050405020304" pitchFamily="18" charset="0"/>
               </a:rPr>
-              <a:t>Verification of </a:t>
-            </a:r>
-            <a:r>
-              <a:rPr lang="en-US" sz="2800" b="1" dirty="0" smtClean="0">
-                <a:latin typeface="Times New Roman" panose="02020603050405020304" pitchFamily="18" charset="0"/>
-                <a:cs typeface="Times New Roman" panose="02020603050405020304" pitchFamily="18" charset="0"/>
-              </a:rPr>
-              <a:t>the </a:t>
+              <a:t>Verification of the </a:t>
             </a:r>
             <a:r>
               <a:rPr lang="en-US" sz="2800" b="1" dirty="0" err="1" smtClean="0">
@@ -4821,7 +4891,7 @@
       </p:sp>
       <p:pic>
         <p:nvPicPr>
-          <p:cNvPr id="5" name="Picture 4"/>
+          <p:cNvPr id="3" name="Picture 2"/>
           <p:cNvPicPr>
             <a:picLocks noChangeAspect="1"/>
           </p:cNvPicPr>
@@ -4835,13 +4905,13 @@
               </a:ext>
             </a:extLst>
           </a:blip>
-          <a:srcRect l="3423" t="14222" r="14358" b="3932"/>
+          <a:srcRect l="3703" t="16421" r="11287" b="3932"/>
           <a:stretch/>
         </p:blipFill>
         <p:spPr>
           <a:xfrm>
-            <a:off x="2960017" y="1253765"/>
-            <a:ext cx="5552388" cy="4911365"/>
+            <a:off x="2969442" y="1414021"/>
+            <a:ext cx="5740925" cy="4779389"/>
           </a:xfrm>
           <a:prstGeom prst="rect">
             <a:avLst/>

</xml_diff>